<commit_message>
new bullets under 'things to add' slide
</commit_message>
<xml_diff>
--- a/agendas/REDCap Meeting Slides April 2016.pptx
+++ b/agendas/REDCap Meeting Slides April 2016.pptx
@@ -320,7 +320,7 @@
           <a:p>
             <a:fld id="{1644C6A4-D0E3-4A58-B3B6-75287851F544}" type="datetimeFigureOut">
               <a:rPr lang="en-US" smtClean="0"/>
-              <a:t>4/4/2016</a:t>
+              <a:t>4/18/2016</a:t>
             </a:fld>
             <a:endParaRPr lang="en-US"/>
           </a:p>
@@ -490,7 +490,7 @@
           <a:p>
             <a:fld id="{1644C6A4-D0E3-4A58-B3B6-75287851F544}" type="datetimeFigureOut">
               <a:rPr lang="en-US" smtClean="0"/>
-              <a:t>4/4/2016</a:t>
+              <a:t>4/18/2016</a:t>
             </a:fld>
             <a:endParaRPr lang="en-US"/>
           </a:p>
@@ -670,7 +670,7 @@
           <a:p>
             <a:fld id="{1644C6A4-D0E3-4A58-B3B6-75287851F544}" type="datetimeFigureOut">
               <a:rPr lang="en-US" smtClean="0"/>
-              <a:t>4/4/2016</a:t>
+              <a:t>4/18/2016</a:t>
             </a:fld>
             <a:endParaRPr lang="en-US"/>
           </a:p>
@@ -840,7 +840,7 @@
           <a:p>
             <a:fld id="{1644C6A4-D0E3-4A58-B3B6-75287851F544}" type="datetimeFigureOut">
               <a:rPr lang="en-US" smtClean="0"/>
-              <a:t>4/4/2016</a:t>
+              <a:t>4/18/2016</a:t>
             </a:fld>
             <a:endParaRPr lang="en-US"/>
           </a:p>
@@ -1086,7 +1086,7 @@
           <a:p>
             <a:fld id="{1644C6A4-D0E3-4A58-B3B6-75287851F544}" type="datetimeFigureOut">
               <a:rPr lang="en-US" smtClean="0"/>
-              <a:t>4/4/2016</a:t>
+              <a:t>4/18/2016</a:t>
             </a:fld>
             <a:endParaRPr lang="en-US"/>
           </a:p>
@@ -1374,7 +1374,7 @@
           <a:p>
             <a:fld id="{1644C6A4-D0E3-4A58-B3B6-75287851F544}" type="datetimeFigureOut">
               <a:rPr lang="en-US" smtClean="0"/>
-              <a:t>4/4/2016</a:t>
+              <a:t>4/18/2016</a:t>
             </a:fld>
             <a:endParaRPr lang="en-US"/>
           </a:p>
@@ -1796,7 +1796,7 @@
           <a:p>
             <a:fld id="{1644C6A4-D0E3-4A58-B3B6-75287851F544}" type="datetimeFigureOut">
               <a:rPr lang="en-US" smtClean="0"/>
-              <a:t>4/4/2016</a:t>
+              <a:t>4/18/2016</a:t>
             </a:fld>
             <a:endParaRPr lang="en-US"/>
           </a:p>
@@ -1914,7 +1914,7 @@
           <a:p>
             <a:fld id="{1644C6A4-D0E3-4A58-B3B6-75287851F544}" type="datetimeFigureOut">
               <a:rPr lang="en-US" smtClean="0"/>
-              <a:t>4/4/2016</a:t>
+              <a:t>4/18/2016</a:t>
             </a:fld>
             <a:endParaRPr lang="en-US"/>
           </a:p>
@@ -2009,7 +2009,7 @@
           <a:p>
             <a:fld id="{1644C6A4-D0E3-4A58-B3B6-75287851F544}" type="datetimeFigureOut">
               <a:rPr lang="en-US" smtClean="0"/>
-              <a:t>4/4/2016</a:t>
+              <a:t>4/18/2016</a:t>
             </a:fld>
             <a:endParaRPr lang="en-US"/>
           </a:p>
@@ -2286,7 +2286,7 @@
           <a:p>
             <a:fld id="{1644C6A4-D0E3-4A58-B3B6-75287851F544}" type="datetimeFigureOut">
               <a:rPr lang="en-US" smtClean="0"/>
-              <a:t>4/4/2016</a:t>
+              <a:t>4/18/2016</a:t>
             </a:fld>
             <a:endParaRPr lang="en-US"/>
           </a:p>
@@ -2539,7 +2539,7 @@
           <a:p>
             <a:fld id="{1644C6A4-D0E3-4A58-B3B6-75287851F544}" type="datetimeFigureOut">
               <a:rPr lang="en-US" smtClean="0"/>
-              <a:t>4/4/2016</a:t>
+              <a:t>4/18/2016</a:t>
             </a:fld>
             <a:endParaRPr lang="en-US"/>
           </a:p>
@@ -2752,7 +2752,7 @@
           <a:p>
             <a:fld id="{1644C6A4-D0E3-4A58-B3B6-75287851F544}" type="datetimeFigureOut">
               <a:rPr lang="en-US" smtClean="0"/>
-              <a:t>4/4/2016</a:t>
+              <a:t>4/18/2016</a:t>
             </a:fld>
             <a:endParaRPr lang="en-US"/>
           </a:p>
@@ -4122,7 +4122,9 @@
         </p:nvSpPr>
         <p:spPr/>
         <p:txBody>
-          <a:bodyPr/>
+          <a:bodyPr>
+            <a:normAutofit fontScale="77500" lnSpcReduction="20000"/>
+          </a:bodyPr>
           <a:lstStyle/>
           <a:p>
             <a:r>
@@ -4139,8 +4141,40 @@
           <a:p>
             <a:r>
               <a:rPr lang="en-US" dirty="0" smtClean="0"/>
-              <a:t>Current FTE support (by category)</a:t>
-            </a:r>
+              <a:t>Current FTE support (by category</a:t>
+            </a:r>
+            <a:r>
+              <a:rPr lang="en-US" dirty="0" smtClean="0"/>
+              <a:t>)</a:t>
+            </a:r>
+          </a:p>
+          <a:p>
+            <a:pPr lvl="1"/>
+            <a:r>
+              <a:rPr lang="en-US" dirty="0" smtClean="0"/>
+              <a:t>Weekly webinar or offices hours</a:t>
+            </a:r>
+          </a:p>
+          <a:p>
+            <a:pPr lvl="1"/>
+            <a:r>
+              <a:rPr lang="en-US" dirty="0" smtClean="0"/>
+              <a:t>Website updates, training videos &amp; Ed Tech-like talks</a:t>
+            </a:r>
+          </a:p>
+          <a:p>
+            <a:pPr lvl="1"/>
+            <a:r>
+              <a:rPr lang="en-US" dirty="0" smtClean="0"/>
+              <a:t>Thomas Wilson’s Twitter account</a:t>
+            </a:r>
+          </a:p>
+          <a:p>
+            <a:r>
+              <a:rPr lang="en-US" dirty="0" smtClean="0"/>
+              <a:t>Urology, bottleneck &amp; transition</a:t>
+            </a:r>
+            <a:endParaRPr lang="en-US" dirty="0" smtClean="0"/>
           </a:p>
           <a:p>
             <a:r>

</xml_diff>